<commit_message>
Updated names of lessons for SP 2 and 3
</commit_message>
<xml_diff>
--- a/en/ProgrammingLessons/PrintingCode.pptx
+++ b/en/ProgrammingLessons/PrintingCode.pptx
@@ -215,7 +215,7 @@
           <a:p>
             <a:fld id="{58040048-1E4D-CD41-AC49-0750EB72586B}" type="datetimeFigureOut">
               <a:rPr lang="en-US" smtClean="0"/>
-              <a:t>5/11/23</a:t>
+              <a:t>5/12/23</a:t>
             </a:fld>
             <a:endParaRPr lang="en-US"/>
           </a:p>
@@ -381,7 +381,7 @@
           <a:p>
             <a:fld id="{2B8484CF-5098-F24E-8881-583515D5C406}" type="datetimeFigureOut">
               <a:rPr lang="en-US" smtClean="0"/>
-              <a:t>5/11/23</a:t>
+              <a:t>5/12/23</a:t>
             </a:fld>
             <a:endParaRPr lang="en-US"/>
           </a:p>
@@ -7947,182 +7947,12 @@
           <a:chExt cx="0" cy="0"/>
         </a:xfrm>
       </p:grpSpPr>
-      <p:sp>
-        <p:nvSpPr>
-          <p:cNvPr id="2" name="Title 1">
+      <p:pic>
+        <p:nvPicPr>
+          <p:cNvPr id="17" name="Picture 16" descr="A blue folder with white text&#10;&#10;Description automatically generated with low confidence">
             <a:extLst>
               <a:ext uri="{FF2B5EF4-FFF2-40B4-BE49-F238E27FC236}">
-                <a16:creationId xmlns:a16="http://schemas.microsoft.com/office/drawing/2014/main" id="{664A1B18-D0C3-44A9-82DC-9A3295EDC83B}"/>
-              </a:ext>
-            </a:extLst>
-          </p:cNvPr>
-          <p:cNvSpPr>
-            <a:spLocks noGrp="1"/>
-          </p:cNvSpPr>
-          <p:nvPr>
-            <p:ph type="title"/>
-          </p:nvPr>
-        </p:nvSpPr>
-        <p:spPr/>
-        <p:txBody>
-          <a:bodyPr/>
-          <a:lstStyle/>
-          <a:p>
-            <a:r>
-              <a:rPr lang="en-US" dirty="0"/>
-              <a:t>HIGH RESOLUTION IMAGES OF CODE</a:t>
-            </a:r>
-          </a:p>
-        </p:txBody>
-      </p:sp>
-      <p:sp>
-        <p:nvSpPr>
-          <p:cNvPr id="3" name="Content Placeholder 2">
-            <a:extLst>
-              <a:ext uri="{FF2B5EF4-FFF2-40B4-BE49-F238E27FC236}">
-                <a16:creationId xmlns:a16="http://schemas.microsoft.com/office/drawing/2014/main" id="{6ED3329B-13BD-4934-84C3-9EF3EF812A27}"/>
-              </a:ext>
-            </a:extLst>
-          </p:cNvPr>
-          <p:cNvSpPr>
-            <a:spLocks noGrp="1"/>
-          </p:cNvSpPr>
-          <p:nvPr>
-            <p:ph idx="1"/>
-          </p:nvPr>
-        </p:nvSpPr>
-        <p:spPr>
-          <a:xfrm>
-            <a:off x="155088" y="1140006"/>
-            <a:ext cx="8767036" cy="5082601"/>
-          </a:xfrm>
-        </p:spPr>
-        <p:txBody>
-          <a:bodyPr/>
-          <a:lstStyle/>
-          <a:p>
-            <a:r>
-              <a:rPr lang="en-US" dirty="0"/>
-              <a:t>Find the SPIKE program files (.</a:t>
-            </a:r>
-            <a:r>
-              <a:rPr lang="en-US" dirty="0" err="1"/>
-              <a:t>llsp</a:t>
-            </a:r>
-            <a:r>
-              <a:rPr lang="en-US" dirty="0"/>
-              <a:t> or .llsp3) on your computer’s hard drive.</a:t>
-            </a:r>
-          </a:p>
-          <a:p>
-            <a:r>
-              <a:rPr lang="en-US" dirty="0"/>
-              <a:t>Duplicate the file and change the extension from .</a:t>
-            </a:r>
-            <a:r>
-              <a:rPr lang="en-US" dirty="0" err="1"/>
-              <a:t>llsp</a:t>
-            </a:r>
-            <a:r>
-              <a:rPr lang="en-US" dirty="0"/>
-              <a:t> or .llsp3 to “.zip”</a:t>
-            </a:r>
-          </a:p>
-          <a:p>
-            <a:r>
-              <a:rPr lang="en-US" dirty="0"/>
-              <a:t>Open the new .zip file you made</a:t>
-            </a:r>
-          </a:p>
-          <a:p>
-            <a:r>
-              <a:rPr lang="en-US" dirty="0"/>
-              <a:t>Inside you will find an </a:t>
-            </a:r>
-            <a:r>
-              <a:rPr lang="en-US" dirty="0" err="1"/>
-              <a:t>icon.svg</a:t>
-            </a:r>
-            <a:r>
-              <a:rPr lang="en-US" dirty="0"/>
-              <a:t> file which will be a high resolution image of your code</a:t>
-            </a:r>
-          </a:p>
-          <a:p>
-            <a:pPr marL="0" indent="0">
-              <a:buNone/>
-            </a:pPr>
-            <a:endParaRPr lang="en-US" dirty="0"/>
-          </a:p>
-          <a:p>
-            <a:endParaRPr lang="en-US" dirty="0"/>
-          </a:p>
-        </p:txBody>
-      </p:sp>
-      <p:sp>
-        <p:nvSpPr>
-          <p:cNvPr id="4" name="Footer Placeholder 3">
-            <a:extLst>
-              <a:ext uri="{FF2B5EF4-FFF2-40B4-BE49-F238E27FC236}">
-                <a16:creationId xmlns:a16="http://schemas.microsoft.com/office/drawing/2014/main" id="{51CA3E5A-309E-452C-B754-3213F3292FEB}"/>
-              </a:ext>
-            </a:extLst>
-          </p:cNvPr>
-          <p:cNvSpPr>
-            <a:spLocks noGrp="1"/>
-          </p:cNvSpPr>
-          <p:nvPr>
-            <p:ph type="ftr" sz="quarter" idx="11"/>
-          </p:nvPr>
-        </p:nvSpPr>
-        <p:spPr/>
-        <p:txBody>
-          <a:bodyPr/>
-          <a:lstStyle/>
-          <a:p>
-            <a:r>
-              <a:rPr lang="en-US"/>
-              <a:t>Copyright © 2023 Prime Lessons (primelessons.org) CC-BY-NC-SA.  (Last edit: 05/11/2023)</a:t>
-            </a:r>
-            <a:endParaRPr lang="en-US" dirty="0"/>
-          </a:p>
-        </p:txBody>
-      </p:sp>
-      <p:sp>
-        <p:nvSpPr>
-          <p:cNvPr id="5" name="Slide Number Placeholder 4">
-            <a:extLst>
-              <a:ext uri="{FF2B5EF4-FFF2-40B4-BE49-F238E27FC236}">
-                <a16:creationId xmlns:a16="http://schemas.microsoft.com/office/drawing/2014/main" id="{49DE00A7-1921-42F5-8C96-E084BCA7DD2E}"/>
-              </a:ext>
-            </a:extLst>
-          </p:cNvPr>
-          <p:cNvSpPr>
-            <a:spLocks noGrp="1"/>
-          </p:cNvSpPr>
-          <p:nvPr>
-            <p:ph type="sldNum" sz="quarter" idx="12"/>
-          </p:nvPr>
-        </p:nvSpPr>
-        <p:spPr/>
-        <p:txBody>
-          <a:bodyPr/>
-          <a:lstStyle/>
-          <a:p>
-            <a:fld id="{BBD74847-7BE4-4E4D-8159-51DF7B93C616}" type="slidenum">
-              <a:rPr lang="en-US" smtClean="0"/>
-              <a:t>4</a:t>
-            </a:fld>
-            <a:endParaRPr lang="en-US"/>
-          </a:p>
-        </p:txBody>
-      </p:sp>
-      <p:pic>
-        <p:nvPicPr>
-          <p:cNvPr id="10" name="Picture 9" descr="A picture containing text, design, screenshot, rectangle&#10;&#10;Description automatically generated">
-            <a:extLst>
-              <a:ext uri="{FF2B5EF4-FFF2-40B4-BE49-F238E27FC236}">
-                <a16:creationId xmlns:a16="http://schemas.microsoft.com/office/drawing/2014/main" id="{6DC8D3B7-D2CC-16D9-7DE3-B2EA075A4653}"/>
+                <a16:creationId xmlns:a16="http://schemas.microsoft.com/office/drawing/2014/main" id="{85259DBF-FE4D-BA85-59D1-6CF4C9DA136F}"/>
               </a:ext>
             </a:extLst>
           </p:cNvPr>
@@ -8131,15 +7961,16 @@
           </p:cNvPicPr>
           <p:nvPr/>
         </p:nvPicPr>
-        <p:blipFill rotWithShape="1">
+        <p:blipFill>
           <a:blip r:embed="rId2"/>
-          <a:srcRect t="10462" r="24748" b="19265"/>
-          <a:stretch/>
+          <a:stretch>
+            <a:fillRect/>
+          </a:stretch>
         </p:blipFill>
         <p:spPr>
           <a:xfrm>
-            <a:off x="5581542" y="3563816"/>
-            <a:ext cx="1320800" cy="1944413"/>
+            <a:off x="4117361" y="2845491"/>
+            <a:ext cx="2531753" cy="2664009"/>
           </a:xfrm>
           <a:prstGeom prst="rect">
             <a:avLst/>
@@ -8148,10 +7979,10 @@
       </p:pic>
       <p:pic>
         <p:nvPicPr>
-          <p:cNvPr id="12" name="Picture 11" descr="A close-up of a document&#10;&#10;Description automatically generated with low confidence">
+          <p:cNvPr id="13" name="Picture 12" descr="A close-up of a zip&#10;&#10;Description automatically generated">
             <a:extLst>
               <a:ext uri="{FF2B5EF4-FFF2-40B4-BE49-F238E27FC236}">
-                <a16:creationId xmlns:a16="http://schemas.microsoft.com/office/drawing/2014/main" id="{5A5A4EA2-DD07-094D-F400-7476B26559E9}"/>
+                <a16:creationId xmlns:a16="http://schemas.microsoft.com/office/drawing/2014/main" id="{BFC7A4CE-0403-96DD-5792-DF36FD633DD8}"/>
               </a:ext>
             </a:extLst>
           </p:cNvPr>
@@ -8168,74 +7999,186 @@
         </p:blipFill>
         <p:spPr>
           <a:xfrm>
-            <a:off x="304213" y="3685934"/>
-            <a:ext cx="1257300" cy="1447800"/>
+            <a:off x="2210290" y="3196768"/>
+            <a:ext cx="2361710" cy="2210561"/>
           </a:xfrm>
           <a:prstGeom prst="rect">
             <a:avLst/>
           </a:prstGeom>
         </p:spPr>
       </p:pic>
-      <p:pic>
-        <p:nvPicPr>
-          <p:cNvPr id="14" name="Picture 13" descr="A picture containing text, screenshot, font, design&#10;&#10;Description automatically generated">
+      <p:sp>
+        <p:nvSpPr>
+          <p:cNvPr id="2" name="Title 1">
             <a:extLst>
               <a:ext uri="{FF2B5EF4-FFF2-40B4-BE49-F238E27FC236}">
-                <a16:creationId xmlns:a16="http://schemas.microsoft.com/office/drawing/2014/main" id="{8A767088-1245-C7CF-2E65-43CF7147DE3D}"/>
+                <a16:creationId xmlns:a16="http://schemas.microsoft.com/office/drawing/2014/main" id="{664A1B18-D0C3-44A9-82DC-9A3295EDC83B}"/>
               </a:ext>
             </a:extLst>
           </p:cNvPr>
-          <p:cNvPicPr>
-            <a:picLocks noChangeAspect="1"/>
-          </p:cNvPicPr>
-          <p:nvPr/>
-        </p:nvPicPr>
-        <p:blipFill>
-          <a:blip r:embed="rId4"/>
-          <a:stretch>
-            <a:fillRect/>
-          </a:stretch>
-        </p:blipFill>
-        <p:spPr>
-          <a:xfrm>
-            <a:off x="2199612" y="3688928"/>
-            <a:ext cx="1079500" cy="1435100"/>
-          </a:xfrm>
-          <a:prstGeom prst="rect">
-            <a:avLst/>
-          </a:prstGeom>
-        </p:spPr>
-      </p:pic>
-      <p:pic>
-        <p:nvPicPr>
-          <p:cNvPr id="16" name="Picture 15" descr="A blue folder with white text&#10;&#10;Description automatically generated with low confidence">
+          <p:cNvSpPr>
+            <a:spLocks noGrp="1"/>
+          </p:cNvSpPr>
+          <p:nvPr>
+            <p:ph type="title"/>
+          </p:nvPr>
+        </p:nvSpPr>
+        <p:spPr/>
+        <p:txBody>
+          <a:bodyPr/>
+          <a:lstStyle/>
+          <a:p>
+            <a:r>
+              <a:rPr lang="en-US" dirty="0"/>
+              <a:t>HIGH RESOLUTION IMAGES OF CODE</a:t>
+            </a:r>
+          </a:p>
+        </p:txBody>
+      </p:sp>
+      <p:sp>
+        <p:nvSpPr>
+          <p:cNvPr id="3" name="Content Placeholder 2">
             <a:extLst>
               <a:ext uri="{FF2B5EF4-FFF2-40B4-BE49-F238E27FC236}">
-                <a16:creationId xmlns:a16="http://schemas.microsoft.com/office/drawing/2014/main" id="{27310C1B-0E0C-F1AF-5B1E-F230B9826186}"/>
+                <a16:creationId xmlns:a16="http://schemas.microsoft.com/office/drawing/2014/main" id="{6ED3329B-13BD-4934-84C3-9EF3EF812A27}"/>
               </a:ext>
             </a:extLst>
           </p:cNvPr>
-          <p:cNvPicPr>
-            <a:picLocks noChangeAspect="1"/>
-          </p:cNvPicPr>
-          <p:nvPr/>
-        </p:nvPicPr>
-        <p:blipFill>
-          <a:blip r:embed="rId5"/>
-          <a:stretch>
-            <a:fillRect/>
-          </a:stretch>
-        </p:blipFill>
-        <p:spPr>
-          <a:xfrm>
-            <a:off x="3951464" y="3685934"/>
-            <a:ext cx="1320800" cy="1460500"/>
-          </a:xfrm>
-          <a:prstGeom prst="rect">
-            <a:avLst/>
-          </a:prstGeom>
-        </p:spPr>
-      </p:pic>
+          <p:cNvSpPr>
+            <a:spLocks noGrp="1"/>
+          </p:cNvSpPr>
+          <p:nvPr>
+            <p:ph idx="1"/>
+          </p:nvPr>
+        </p:nvSpPr>
+        <p:spPr>
+          <a:xfrm>
+            <a:off x="155088" y="1140006"/>
+            <a:ext cx="8767036" cy="2616346"/>
+          </a:xfrm>
+        </p:spPr>
+        <p:txBody>
+          <a:bodyPr>
+            <a:normAutofit/>
+          </a:bodyPr>
+          <a:lstStyle/>
+          <a:p>
+            <a:r>
+              <a:rPr lang="en-US" dirty="0"/>
+              <a:t>Find the SPIKE program files (.</a:t>
+            </a:r>
+            <a:r>
+              <a:rPr lang="en-US" dirty="0" err="1"/>
+              <a:t>llsp</a:t>
+            </a:r>
+            <a:r>
+              <a:rPr lang="en-US" dirty="0"/>
+              <a:t> or .llsp3) on your computer’s hard drive.</a:t>
+            </a:r>
+          </a:p>
+          <a:p>
+            <a:r>
+              <a:rPr lang="en-US" dirty="0"/>
+              <a:t>Duplicate the file and change the extension from .</a:t>
+            </a:r>
+            <a:r>
+              <a:rPr lang="en-US" dirty="0" err="1"/>
+              <a:t>llsp</a:t>
+            </a:r>
+            <a:r>
+              <a:rPr lang="en-US" dirty="0"/>
+              <a:t> or .llsp3 to “.zip”</a:t>
+            </a:r>
+          </a:p>
+          <a:p>
+            <a:r>
+              <a:rPr lang="en-US" dirty="0"/>
+              <a:t>Open the new .zip file you made</a:t>
+            </a:r>
+          </a:p>
+          <a:p>
+            <a:r>
+              <a:rPr lang="en-US" dirty="0"/>
+              <a:t>Inside you will find an </a:t>
+            </a:r>
+            <a:r>
+              <a:rPr lang="en-US" dirty="0" err="1"/>
+              <a:t>icon.svg</a:t>
+            </a:r>
+            <a:r>
+              <a:rPr lang="en-US" dirty="0"/>
+              <a:t> file which will be a high resolution image of your code</a:t>
+            </a:r>
+          </a:p>
+          <a:p>
+            <a:pPr marL="0" indent="0">
+              <a:buNone/>
+            </a:pPr>
+            <a:endParaRPr lang="en-US" dirty="0"/>
+          </a:p>
+          <a:p>
+            <a:endParaRPr lang="en-US" dirty="0"/>
+          </a:p>
+        </p:txBody>
+      </p:sp>
+      <p:sp>
+        <p:nvSpPr>
+          <p:cNvPr id="4" name="Footer Placeholder 3">
+            <a:extLst>
+              <a:ext uri="{FF2B5EF4-FFF2-40B4-BE49-F238E27FC236}">
+                <a16:creationId xmlns:a16="http://schemas.microsoft.com/office/drawing/2014/main" id="{51CA3E5A-309E-452C-B754-3213F3292FEB}"/>
+              </a:ext>
+            </a:extLst>
+          </p:cNvPr>
+          <p:cNvSpPr>
+            <a:spLocks noGrp="1"/>
+          </p:cNvSpPr>
+          <p:nvPr>
+            <p:ph type="ftr" sz="quarter" idx="11"/>
+          </p:nvPr>
+        </p:nvSpPr>
+        <p:spPr/>
+        <p:txBody>
+          <a:bodyPr/>
+          <a:lstStyle/>
+          <a:p>
+            <a:r>
+              <a:rPr lang="en-US"/>
+              <a:t>Copyright © 2023 Prime Lessons (primelessons.org) CC-BY-NC-SA.  (Last edit: 05/11/2023)</a:t>
+            </a:r>
+            <a:endParaRPr lang="en-US" dirty="0"/>
+          </a:p>
+        </p:txBody>
+      </p:sp>
+      <p:sp>
+        <p:nvSpPr>
+          <p:cNvPr id="5" name="Slide Number Placeholder 4">
+            <a:extLst>
+              <a:ext uri="{FF2B5EF4-FFF2-40B4-BE49-F238E27FC236}">
+                <a16:creationId xmlns:a16="http://schemas.microsoft.com/office/drawing/2014/main" id="{49DE00A7-1921-42F5-8C96-E084BCA7DD2E}"/>
+              </a:ext>
+            </a:extLst>
+          </p:cNvPr>
+          <p:cNvSpPr>
+            <a:spLocks noGrp="1"/>
+          </p:cNvSpPr>
+          <p:nvPr>
+            <p:ph type="sldNum" sz="quarter" idx="12"/>
+          </p:nvPr>
+        </p:nvSpPr>
+        <p:spPr/>
+        <p:txBody>
+          <a:bodyPr/>
+          <a:lstStyle/>
+          <a:p>
+            <a:fld id="{BBD74847-7BE4-4E4D-8159-51DF7B93C616}" type="slidenum">
+              <a:rPr lang="en-US" smtClean="0"/>
+              <a:t>4</a:t>
+            </a:fld>
+            <a:endParaRPr lang="en-US"/>
+          </a:p>
+        </p:txBody>
+      </p:sp>
       <p:cxnSp>
         <p:nvCxnSpPr>
           <p:cNvPr id="18" name="Straight Arrow Connector 17">
@@ -8250,7 +8193,7 @@
         </p:nvCxnSpPr>
         <p:spPr>
           <a:xfrm>
-            <a:off x="1673451" y="4293990"/>
+            <a:off x="2024684" y="4022504"/>
             <a:ext cx="371211" cy="0"/>
           </a:xfrm>
           <a:prstGeom prst="straightConnector1">
@@ -8292,7 +8235,7 @@
         </p:nvCxnSpPr>
         <p:spPr>
           <a:xfrm>
-            <a:off x="3454955" y="4310401"/>
+            <a:off x="3929194" y="4022504"/>
             <a:ext cx="371211" cy="0"/>
           </a:xfrm>
           <a:prstGeom prst="straightConnector1">
@@ -8329,13 +8272,15 @@
               </a:ext>
             </a:extLst>
           </p:cNvPr>
-          <p:cNvCxnSpPr/>
+          <p:cNvCxnSpPr>
+            <a:cxnSpLocks/>
+          </p:cNvCxnSpPr>
           <p:nvPr/>
         </p:nvCxnSpPr>
         <p:spPr>
           <a:xfrm>
-            <a:off x="5406567" y="4293990"/>
-            <a:ext cx="371211" cy="0"/>
+            <a:off x="6075331" y="4022504"/>
+            <a:ext cx="451928" cy="0"/>
           </a:xfrm>
           <a:prstGeom prst="straightConnector1">
             <a:avLst/>
@@ -8362,54 +8307,55 @@
           </a:fontRef>
         </p:style>
       </p:cxnSp>
-      <p:cxnSp>
-        <p:nvCxnSpPr>
-          <p:cNvPr id="21" name="Straight Arrow Connector 20">
+      <p:sp>
+        <p:nvSpPr>
+          <p:cNvPr id="24" name="TextBox 23">
             <a:extLst>
               <a:ext uri="{FF2B5EF4-FFF2-40B4-BE49-F238E27FC236}">
-                <a16:creationId xmlns:a16="http://schemas.microsoft.com/office/drawing/2014/main" id="{D44E995B-237E-B29D-3EDE-9A00C31ACAF4}"/>
+                <a16:creationId xmlns:a16="http://schemas.microsoft.com/office/drawing/2014/main" id="{481919FD-25CC-B956-F1CA-EE76CDC9CFC1}"/>
               </a:ext>
             </a:extLst>
           </p:cNvPr>
-          <p:cNvCxnSpPr/>
+          <p:cNvSpPr txBox="1"/>
           <p:nvPr/>
-        </p:nvCxnSpPr>
-        <p:spPr>
-          <a:xfrm>
-            <a:off x="6931878" y="4292058"/>
-            <a:ext cx="371211" cy="0"/>
-          </a:xfrm>
-          <a:prstGeom prst="straightConnector1">
-            <a:avLst/>
-          </a:prstGeom>
-          <a:ln w="38100">
-            <a:solidFill>
-              <a:srgbClr val="C00000"/>
-            </a:solidFill>
-            <a:tailEnd type="triangle"/>
-          </a:ln>
-        </p:spPr>
-        <p:style>
-          <a:lnRef idx="1">
-            <a:schemeClr val="accent1"/>
-          </a:lnRef>
-          <a:fillRef idx="0">
-            <a:schemeClr val="accent1"/>
-          </a:fillRef>
-          <a:effectRef idx="0">
-            <a:schemeClr val="accent1"/>
-          </a:effectRef>
-          <a:fontRef idx="minor">
-            <a:schemeClr val="tx1"/>
-          </a:fontRef>
-        </p:style>
-      </p:cxnSp>
+        </p:nvSpPr>
+        <p:spPr>
+          <a:xfrm>
+            <a:off x="175260" y="5857461"/>
+            <a:ext cx="6464079" cy="369332"/>
+          </a:xfrm>
+          <a:prstGeom prst="rect">
+            <a:avLst/>
+          </a:prstGeom>
+          <a:noFill/>
+        </p:spPr>
+        <p:txBody>
+          <a:bodyPr wrap="square" rtlCol="0">
+            <a:spAutoFit/>
+          </a:bodyPr>
+          <a:lstStyle/>
+          <a:p>
+            <a:r>
+              <a:rPr lang="en-US" dirty="0"/>
+              <a:t>Note: SPIKE 2 uses .</a:t>
+            </a:r>
+            <a:r>
+              <a:rPr lang="en-US" dirty="0" err="1"/>
+              <a:t>llsp</a:t>
+            </a:r>
+            <a:r>
+              <a:rPr lang="en-US" dirty="0"/>
+              <a:t> and SPIKE 3 uses .llsp3</a:t>
+            </a:r>
+          </a:p>
+        </p:txBody>
+      </p:sp>
       <p:pic>
         <p:nvPicPr>
-          <p:cNvPr id="23" name="Picture 22" descr="A screenshot of a computer game&#10;&#10;Description automatically generated with low confidence">
+          <p:cNvPr id="9" name="Picture 8" descr="A close-up of a sticker&#10;&#10;Description automatically generated with medium confidence">
             <a:extLst>
               <a:ext uri="{FF2B5EF4-FFF2-40B4-BE49-F238E27FC236}">
-                <a16:creationId xmlns:a16="http://schemas.microsoft.com/office/drawing/2014/main" id="{B7690E89-434F-3425-DF62-D91C6C2B42B7}"/>
+                <a16:creationId xmlns:a16="http://schemas.microsoft.com/office/drawing/2014/main" id="{D0C4008D-7829-D421-B69F-642417250672}"/>
               </a:ext>
             </a:extLst>
           </p:cNvPr>
@@ -8419,64 +8365,51 @@
           <p:nvPr/>
         </p:nvPicPr>
         <p:blipFill>
-          <a:blip r:embed="rId6"/>
+          <a:blip r:embed="rId4"/>
           <a:stretch>
             <a:fillRect/>
           </a:stretch>
         </p:blipFill>
         <p:spPr>
           <a:xfrm>
-            <a:off x="7476392" y="3646608"/>
-            <a:ext cx="1266703" cy="1421370"/>
+            <a:off x="377390" y="3163767"/>
+            <a:ext cx="1681537" cy="2210560"/>
           </a:xfrm>
           <a:prstGeom prst="rect">
             <a:avLst/>
           </a:prstGeom>
         </p:spPr>
       </p:pic>
-      <p:sp>
-        <p:nvSpPr>
-          <p:cNvPr id="24" name="TextBox 23">
+      <p:pic>
+        <p:nvPicPr>
+          <p:cNvPr id="25" name="Picture 24" descr="A picture containing text, tool, design&#10;&#10;Description automatically generated">
             <a:extLst>
               <a:ext uri="{FF2B5EF4-FFF2-40B4-BE49-F238E27FC236}">
-                <a16:creationId xmlns:a16="http://schemas.microsoft.com/office/drawing/2014/main" id="{481919FD-25CC-B956-F1CA-EE76CDC9CFC1}"/>
+                <a16:creationId xmlns:a16="http://schemas.microsoft.com/office/drawing/2014/main" id="{667F5024-242E-EDF9-6692-F3E9E7D51411}"/>
               </a:ext>
             </a:extLst>
           </p:cNvPr>
-          <p:cNvSpPr txBox="1"/>
+          <p:cNvPicPr>
+            <a:picLocks noChangeAspect="1"/>
+          </p:cNvPicPr>
           <p:nvPr/>
-        </p:nvSpPr>
-        <p:spPr>
-          <a:xfrm>
-            <a:off x="175260" y="5857461"/>
-            <a:ext cx="6464079" cy="369332"/>
+        </p:nvPicPr>
+        <p:blipFill>
+          <a:blip r:embed="rId5"/>
+          <a:stretch>
+            <a:fillRect/>
+          </a:stretch>
+        </p:blipFill>
+        <p:spPr>
+          <a:xfrm>
+            <a:off x="6630434" y="3322163"/>
+            <a:ext cx="1398132" cy="2002730"/>
           </a:xfrm>
           <a:prstGeom prst="rect">
             <a:avLst/>
           </a:prstGeom>
-          <a:noFill/>
-        </p:spPr>
-        <p:txBody>
-          <a:bodyPr wrap="square" rtlCol="0">
-            <a:spAutoFit/>
-          </a:bodyPr>
-          <a:lstStyle/>
-          <a:p>
-            <a:r>
-              <a:rPr lang="en-US" dirty="0"/>
-              <a:t>Note: SPIKE 2 uses .</a:t>
-            </a:r>
-            <a:r>
-              <a:rPr lang="en-US" dirty="0" err="1"/>
-              <a:t>llsp</a:t>
-            </a:r>
-            <a:r>
-              <a:rPr lang="en-US" dirty="0"/>
-              <a:t> and SPIKE 3 uses .llsp3</a:t>
-            </a:r>
-          </a:p>
-        </p:txBody>
-      </p:sp>
+        </p:spPr>
+      </p:pic>
     </p:spTree>
     <p:extLst>
       <p:ext uri="{BB962C8B-B14F-4D97-AF65-F5344CB8AC3E}">
@@ -8542,7 +8475,7 @@
         <p:spPr>
           <a:xfrm>
             <a:off x="457200" y="1317983"/>
-            <a:ext cx="8245474" cy="1145345"/>
+            <a:ext cx="8245474" cy="1925280"/>
           </a:xfrm>
         </p:spPr>
         <p:txBody>
@@ -8583,7 +8516,7 @@
             </a:r>
             <a:r>
               <a:rPr lang="en-US" sz="1600" dirty="0"/>
-              <a:t> </a:t>
+              <a:t> on FLL: Share &amp; Learn</a:t>
             </a:r>
           </a:p>
           <a:p>
@@ -8671,7 +8604,7 @@
           <a:effectLst/>
           <a:extLst>
             <a:ext uri="{91240B29-F687-4f45-9708-019B960494DF}">
-              <a14:hiddenLine xmlns:a14="http://schemas.microsoft.com/office/drawing/2010/main" xmlns="" w="9525">
+              <a14:hiddenLine xmlns="" xmlns:a14="http://schemas.microsoft.com/office/drawing/2010/main" w="9525">
                 <a:solidFill>
                   <a:schemeClr val="tx1"/>
                 </a:solidFill>
@@ -8681,7 +8614,7 @@
               </a14:hiddenLine>
             </a:ext>
             <a:ext uri="{AF507438-7753-43e0-B8FC-AC1667EBCBE1}">
-              <a14:hiddenEffects xmlns:a14="http://schemas.microsoft.com/office/drawing/2010/main" xmlns="">
+              <a14:hiddenEffects xmlns="" xmlns:a14="http://schemas.microsoft.com/office/drawing/2010/main">
                 <a:effectLst>
                   <a:outerShdw dist="35921" dir="2700000" algn="ctr" rotWithShape="0">
                     <a:schemeClr val="bg2"/>
@@ -9022,7 +8955,7 @@
           <a:noFill/>
           <a:extLst>
             <a:ext uri="{909E8E84-426E-40dd-AFC4-6F175D3DCCD1}">
-              <a14:hiddenFill xmlns:a14="http://schemas.microsoft.com/office/drawing/2010/main" xmlns="">
+              <a14:hiddenFill xmlns="" xmlns:a14="http://schemas.microsoft.com/office/drawing/2010/main">
                 <a:solidFill>
                   <a:srgbClr val="FFFFFF"/>
                 </a:solidFill>

</xml_diff>